<commit_message>
Feat/EXEC : Fix ppt
</commit_message>
<xml_diff>
--- a/exec/4. 시연 시나리오/도담도담_시연시나리오.pptx
+++ b/exec/4. 시연 시나리오/도담도담_시연시나리오.pptx
@@ -15,12 +15,11 @@
     <p:sldId id="268" r:id="rId9"/>
     <p:sldId id="260" r:id="rId10"/>
     <p:sldId id="263" r:id="rId11"/>
-    <p:sldId id="270" r:id="rId12"/>
-    <p:sldId id="265" r:id="rId13"/>
-    <p:sldId id="269" r:id="rId14"/>
-    <p:sldId id="272" r:id="rId15"/>
-    <p:sldId id="262" r:id="rId16"/>
-    <p:sldId id="271" r:id="rId17"/>
+    <p:sldId id="265" r:id="rId12"/>
+    <p:sldId id="269" r:id="rId13"/>
+    <p:sldId id="272" r:id="rId14"/>
+    <p:sldId id="262" r:id="rId15"/>
+    <p:sldId id="271" r:id="rId16"/>
   </p:sldIdLst>
   <p:sldSz cx="12192000" cy="6858000"/>
   <p:notesSz cx="6858000" cy="9144000"/>
@@ -119,6 +118,11 @@
       </a:defRPr>
     </a:lvl9pPr>
   </p:defaultTextStyle>
+  <p:extLst>
+    <p:ext uri="{EFAFB233-063F-42B5-8137-9DF3F51BA10A}">
+      <p15:sldGuideLst xmlns:p15="http://schemas.microsoft.com/office/powerpoint/2012/main"/>
+    </p:ext>
+  </p:extLst>
 </p:presentation>
 </file>
 
@@ -253,7 +257,7 @@
           <a:p>
             <a:fld id="{074CCF9D-6753-49BA-8B8E-08E1567A33B7}" type="datetimeFigureOut">
               <a:rPr lang="ko-KR" altLang="en-US" smtClean="0"/>
-              <a:t>2022-05-19</a:t>
+              <a:t>2022-05-20</a:t>
             </a:fld>
             <a:endParaRPr lang="ko-KR" altLang="en-US"/>
           </a:p>
@@ -423,7 +427,7 @@
           <a:p>
             <a:fld id="{074CCF9D-6753-49BA-8B8E-08E1567A33B7}" type="datetimeFigureOut">
               <a:rPr lang="ko-KR" altLang="en-US" smtClean="0"/>
-              <a:t>2022-05-19</a:t>
+              <a:t>2022-05-20</a:t>
             </a:fld>
             <a:endParaRPr lang="ko-KR" altLang="en-US"/>
           </a:p>
@@ -603,7 +607,7 @@
           <a:p>
             <a:fld id="{074CCF9D-6753-49BA-8B8E-08E1567A33B7}" type="datetimeFigureOut">
               <a:rPr lang="ko-KR" altLang="en-US" smtClean="0"/>
-              <a:t>2022-05-19</a:t>
+              <a:t>2022-05-20</a:t>
             </a:fld>
             <a:endParaRPr lang="ko-KR" altLang="en-US"/>
           </a:p>
@@ -773,7 +777,7 @@
           <a:p>
             <a:fld id="{074CCF9D-6753-49BA-8B8E-08E1567A33B7}" type="datetimeFigureOut">
               <a:rPr lang="ko-KR" altLang="en-US" smtClean="0"/>
-              <a:t>2022-05-19</a:t>
+              <a:t>2022-05-20</a:t>
             </a:fld>
             <a:endParaRPr lang="ko-KR" altLang="en-US"/>
           </a:p>
@@ -1019,7 +1023,7 @@
           <a:p>
             <a:fld id="{074CCF9D-6753-49BA-8B8E-08E1567A33B7}" type="datetimeFigureOut">
               <a:rPr lang="ko-KR" altLang="en-US" smtClean="0"/>
-              <a:t>2022-05-19</a:t>
+              <a:t>2022-05-20</a:t>
             </a:fld>
             <a:endParaRPr lang="ko-KR" altLang="en-US"/>
           </a:p>
@@ -1251,7 +1255,7 @@
           <a:p>
             <a:fld id="{074CCF9D-6753-49BA-8B8E-08E1567A33B7}" type="datetimeFigureOut">
               <a:rPr lang="ko-KR" altLang="en-US" smtClean="0"/>
-              <a:t>2022-05-19</a:t>
+              <a:t>2022-05-20</a:t>
             </a:fld>
             <a:endParaRPr lang="ko-KR" altLang="en-US"/>
           </a:p>
@@ -1618,7 +1622,7 @@
           <a:p>
             <a:fld id="{074CCF9D-6753-49BA-8B8E-08E1567A33B7}" type="datetimeFigureOut">
               <a:rPr lang="ko-KR" altLang="en-US" smtClean="0"/>
-              <a:t>2022-05-19</a:t>
+              <a:t>2022-05-20</a:t>
             </a:fld>
             <a:endParaRPr lang="ko-KR" altLang="en-US"/>
           </a:p>
@@ -1736,7 +1740,7 @@
           <a:p>
             <a:fld id="{074CCF9D-6753-49BA-8B8E-08E1567A33B7}" type="datetimeFigureOut">
               <a:rPr lang="ko-KR" altLang="en-US" smtClean="0"/>
-              <a:t>2022-05-19</a:t>
+              <a:t>2022-05-20</a:t>
             </a:fld>
             <a:endParaRPr lang="ko-KR" altLang="en-US"/>
           </a:p>
@@ -1831,7 +1835,7 @@
           <a:p>
             <a:fld id="{074CCF9D-6753-49BA-8B8E-08E1567A33B7}" type="datetimeFigureOut">
               <a:rPr lang="ko-KR" altLang="en-US" smtClean="0"/>
-              <a:t>2022-05-19</a:t>
+              <a:t>2022-05-20</a:t>
             </a:fld>
             <a:endParaRPr lang="ko-KR" altLang="en-US"/>
           </a:p>
@@ -2108,7 +2112,7 @@
           <a:p>
             <a:fld id="{074CCF9D-6753-49BA-8B8E-08E1567A33B7}" type="datetimeFigureOut">
               <a:rPr lang="ko-KR" altLang="en-US" smtClean="0"/>
-              <a:t>2022-05-19</a:t>
+              <a:t>2022-05-20</a:t>
             </a:fld>
             <a:endParaRPr lang="ko-KR" altLang="en-US"/>
           </a:p>
@@ -2361,7 +2365,7 @@
           <a:p>
             <a:fld id="{074CCF9D-6753-49BA-8B8E-08E1567A33B7}" type="datetimeFigureOut">
               <a:rPr lang="ko-KR" altLang="en-US" smtClean="0"/>
-              <a:t>2022-05-19</a:t>
+              <a:t>2022-05-20</a:t>
             </a:fld>
             <a:endParaRPr lang="ko-KR" altLang="en-US"/>
           </a:p>
@@ -2577,7 +2581,7 @@
           <a:p>
             <a:fld id="{074CCF9D-6753-49BA-8B8E-08E1567A33B7}" type="datetimeFigureOut">
               <a:rPr lang="ko-KR" altLang="en-US" smtClean="0"/>
-              <a:t>2022-05-19</a:t>
+              <a:t>2022-05-20</a:t>
             </a:fld>
             <a:endParaRPr lang="ko-KR" altLang="en-US"/>
           </a:p>
@@ -3857,7 +3861,7 @@
         </p:blipFill>
         <p:spPr>
           <a:xfrm>
-            <a:off x="1109412" y="0"/>
+            <a:off x="1061787" y="0"/>
             <a:ext cx="3248526" cy="6858000"/>
           </a:xfrm>
           <a:prstGeom prst="rect">
@@ -3867,262 +3871,17 @@
       </p:pic>
       <p:sp>
         <p:nvSpPr>
-          <p:cNvPr id="5" name="타원 4"/>
+          <p:cNvPr id="5" name="모서리가 둥근 직사각형 4"/>
           <p:cNvSpPr/>
           <p:nvPr/>
         </p:nvSpPr>
         <p:spPr>
           <a:xfrm>
-            <a:off x="5390913" y="1431964"/>
-            <a:ext cx="245034" cy="237392"/>
-          </a:xfrm>
-          <a:prstGeom prst="ellipse">
-            <a:avLst/>
-          </a:prstGeom>
-          <a:noFill/>
-          <a:ln w="28575">
-            <a:solidFill>
-              <a:srgbClr val="FF0000"/>
-            </a:solidFill>
-          </a:ln>
-        </p:spPr>
-        <p:style>
-          <a:lnRef idx="2">
-            <a:schemeClr val="accent1">
-              <a:shade val="50000"/>
-            </a:schemeClr>
-          </a:lnRef>
-          <a:fillRef idx="1">
-            <a:schemeClr val="accent1"/>
-          </a:fillRef>
-          <a:effectRef idx="0">
-            <a:schemeClr val="accent1"/>
-          </a:effectRef>
-          <a:fontRef idx="minor">
-            <a:schemeClr val="lt1"/>
-          </a:fontRef>
-        </p:style>
-        <p:txBody>
-          <a:bodyPr rtlCol="0" anchor="ctr"/>
-          <a:lstStyle/>
-          <a:p>
-            <a:pPr algn="ctr"/>
-            <a:r>
-              <a:rPr lang="en-US" altLang="ko-KR" b="1" dirty="0" smtClean="0">
-                <a:solidFill>
-                  <a:srgbClr val="FF0000"/>
-                </a:solidFill>
-              </a:rPr>
-              <a:t>1</a:t>
-            </a:r>
-            <a:endParaRPr lang="ko-KR" altLang="en-US" b="1" dirty="0">
-              <a:solidFill>
-                <a:srgbClr val="FF0000"/>
-              </a:solidFill>
-            </a:endParaRPr>
-          </a:p>
-        </p:txBody>
-      </p:sp>
-      <p:sp>
-        <p:nvSpPr>
-          <p:cNvPr id="6" name="타원 5"/>
-          <p:cNvSpPr/>
-          <p:nvPr/>
-        </p:nvSpPr>
-        <p:spPr>
-          <a:xfrm>
-            <a:off x="5395780" y="3148887"/>
-            <a:ext cx="245034" cy="237392"/>
-          </a:xfrm>
-          <a:prstGeom prst="ellipse">
-            <a:avLst/>
-          </a:prstGeom>
-          <a:noFill/>
-          <a:ln w="28575">
-            <a:solidFill>
-              <a:srgbClr val="FF0000"/>
-            </a:solidFill>
-          </a:ln>
-        </p:spPr>
-        <p:style>
-          <a:lnRef idx="2">
-            <a:schemeClr val="accent1">
-              <a:shade val="50000"/>
-            </a:schemeClr>
-          </a:lnRef>
-          <a:fillRef idx="1">
-            <a:schemeClr val="accent1"/>
-          </a:fillRef>
-          <a:effectRef idx="0">
-            <a:schemeClr val="accent1"/>
-          </a:effectRef>
-          <a:fontRef idx="minor">
-            <a:schemeClr val="lt1"/>
-          </a:fontRef>
-        </p:style>
-        <p:txBody>
-          <a:bodyPr rtlCol="0" anchor="ctr"/>
-          <a:lstStyle/>
-          <a:p>
-            <a:pPr algn="ctr"/>
-            <a:r>
-              <a:rPr lang="en-US" altLang="ko-KR" b="1" smtClean="0">
-                <a:solidFill>
-                  <a:srgbClr val="FF0000"/>
-                </a:solidFill>
-              </a:rPr>
-              <a:t>2</a:t>
-            </a:r>
-            <a:endParaRPr lang="ko-KR" altLang="en-US" b="1" dirty="0">
-              <a:solidFill>
-                <a:srgbClr val="FF0000"/>
-              </a:solidFill>
-            </a:endParaRPr>
-          </a:p>
-        </p:txBody>
-      </p:sp>
-      <p:sp>
-        <p:nvSpPr>
-          <p:cNvPr id="7" name="TextBox 6"/>
-          <p:cNvSpPr txBox="1"/>
-          <p:nvPr/>
-        </p:nvSpPr>
-        <p:spPr>
-          <a:xfrm>
-            <a:off x="5628307" y="1388274"/>
-            <a:ext cx="6163643" cy="1200329"/>
-          </a:xfrm>
-          <a:prstGeom prst="rect">
-            <a:avLst/>
-          </a:prstGeom>
-          <a:noFill/>
-        </p:spPr>
-        <p:txBody>
-          <a:bodyPr wrap="square" rtlCol="0">
-            <a:spAutoFit/>
-          </a:bodyPr>
-          <a:lstStyle/>
-          <a:p>
-            <a:r>
-              <a:rPr lang="ko-KR" altLang="en-US" b="1" dirty="0" err="1" smtClean="0"/>
-              <a:t>일정확인</a:t>
-            </a:r>
-            <a:endParaRPr lang="en-US" altLang="ko-KR" b="1" dirty="0" smtClean="0"/>
-          </a:p>
-          <a:p>
-            <a:pPr marL="342900" indent="-342900">
-              <a:buAutoNum type="arabicPeriod"/>
-            </a:pPr>
-            <a:r>
-              <a:rPr lang="ko-KR" altLang="en-US" b="1" dirty="0" smtClean="0"/>
-              <a:t>분홍색 </a:t>
-            </a:r>
-            <a:r>
-              <a:rPr lang="en-US" altLang="ko-KR" b="1" dirty="0" smtClean="0"/>
-              <a:t>– </a:t>
-            </a:r>
-            <a:r>
-              <a:rPr lang="ko-KR" altLang="en-US" b="1" dirty="0" smtClean="0"/>
-              <a:t>선택 일자</a:t>
-            </a:r>
-            <a:endParaRPr lang="en-US" altLang="ko-KR" b="1" dirty="0" smtClean="0"/>
-          </a:p>
-          <a:p>
-            <a:pPr marL="342900" indent="-342900">
-              <a:buAutoNum type="arabicPeriod"/>
-            </a:pPr>
-            <a:r>
-              <a:rPr lang="ko-KR" altLang="en-US" b="1" dirty="0" smtClean="0"/>
-              <a:t>짙은 분홍색 </a:t>
-            </a:r>
-            <a:r>
-              <a:rPr lang="en-US" altLang="ko-KR" b="1" dirty="0" smtClean="0"/>
-              <a:t>– </a:t>
-            </a:r>
-            <a:r>
-              <a:rPr lang="ko-KR" altLang="en-US" b="1" dirty="0" smtClean="0"/>
-              <a:t>오늘 일자</a:t>
-            </a:r>
-            <a:endParaRPr lang="en-US" altLang="ko-KR" b="1" dirty="0" smtClean="0"/>
-          </a:p>
-          <a:p>
-            <a:pPr marL="342900" indent="-342900">
-              <a:buAutoNum type="arabicPeriod"/>
-            </a:pPr>
-            <a:r>
-              <a:rPr lang="ko-KR" altLang="en-US" b="1" dirty="0" smtClean="0"/>
-              <a:t>해당일에 일정이 있을 시</a:t>
-            </a:r>
-            <a:r>
-              <a:rPr lang="en-US" altLang="ko-KR" b="1" dirty="0" smtClean="0"/>
-              <a:t>, </a:t>
-            </a:r>
-            <a:r>
-              <a:rPr lang="ko-KR" altLang="en-US" b="1" dirty="0" smtClean="0"/>
-              <a:t>날짜 밑에 검은 점으로 표시</a:t>
-            </a:r>
-            <a:endParaRPr lang="en-US" altLang="ko-KR" b="1" dirty="0" smtClean="0"/>
-          </a:p>
-        </p:txBody>
-      </p:sp>
-      <p:sp>
-        <p:nvSpPr>
-          <p:cNvPr id="8" name="TextBox 7"/>
-          <p:cNvSpPr txBox="1"/>
-          <p:nvPr/>
-        </p:nvSpPr>
-        <p:spPr>
-          <a:xfrm>
-            <a:off x="5628306" y="3087364"/>
-            <a:ext cx="6163644" cy="646331"/>
-          </a:xfrm>
-          <a:prstGeom prst="rect">
-            <a:avLst/>
-          </a:prstGeom>
-          <a:noFill/>
-        </p:spPr>
-        <p:txBody>
-          <a:bodyPr wrap="square" rtlCol="0">
-            <a:spAutoFit/>
-          </a:bodyPr>
-          <a:lstStyle/>
-          <a:p>
-            <a:r>
-              <a:rPr lang="ko-KR" altLang="en-US" b="1" dirty="0" smtClean="0"/>
-              <a:t>새로 고침</a:t>
-            </a:r>
-          </a:p>
-          <a:p>
-            <a:pPr marL="342900" indent="-342900">
-              <a:buAutoNum type="arabicPeriod"/>
-            </a:pPr>
-            <a:r>
-              <a:rPr lang="ko-KR" altLang="en-US" b="1" dirty="0" err="1" smtClean="0"/>
-              <a:t>클릭시</a:t>
-            </a:r>
-            <a:r>
-              <a:rPr lang="ko-KR" altLang="en-US" b="1" dirty="0" smtClean="0"/>
-              <a:t> 페이지 새로 고침</a:t>
-            </a:r>
-            <a:endParaRPr lang="en-US" altLang="ko-KR" b="1" dirty="0" smtClean="0"/>
-          </a:p>
-        </p:txBody>
-      </p:sp>
-      <p:sp>
-        <p:nvSpPr>
-          <p:cNvPr id="9" name="모서리가 둥근 직사각형 8"/>
-          <p:cNvSpPr/>
-          <p:nvPr/>
-        </p:nvSpPr>
-        <p:spPr>
-          <a:xfrm>
-            <a:off x="1109412" y="4086225"/>
-            <a:ext cx="3248526" cy="1904999"/>
+            <a:off x="1785101" y="5981700"/>
+            <a:ext cx="576628" cy="499696"/>
           </a:xfrm>
           <a:prstGeom prst="roundRect">
-            <a:avLst>
-              <a:gd name="adj" fmla="val 10761"/>
-            </a:avLst>
+            <a:avLst/>
           </a:prstGeom>
           <a:noFill/>
           <a:ln w="57150">
@@ -4157,19 +3916,185 @@
       </p:sp>
       <p:sp>
         <p:nvSpPr>
-          <p:cNvPr id="10" name="모서리가 둥근 직사각형 9"/>
+          <p:cNvPr id="6" name="타원 5"/>
           <p:cNvSpPr/>
           <p:nvPr/>
         </p:nvSpPr>
         <p:spPr>
           <a:xfrm>
-            <a:off x="3790951" y="3575151"/>
-            <a:ext cx="457200" cy="378027"/>
+            <a:off x="2445181" y="6112852"/>
+            <a:ext cx="237392" cy="237392"/>
+          </a:xfrm>
+          <a:prstGeom prst="ellipse">
+            <a:avLst/>
+          </a:prstGeom>
+          <a:noFill/>
+          <a:ln w="28575">
+            <a:solidFill>
+              <a:srgbClr val="FF0000"/>
+            </a:solidFill>
+          </a:ln>
+        </p:spPr>
+        <p:style>
+          <a:lnRef idx="2">
+            <a:schemeClr val="accent1">
+              <a:shade val="50000"/>
+            </a:schemeClr>
+          </a:lnRef>
+          <a:fillRef idx="1">
+            <a:schemeClr val="accent1"/>
+          </a:fillRef>
+          <a:effectRef idx="0">
+            <a:schemeClr val="accent1"/>
+          </a:effectRef>
+          <a:fontRef idx="minor">
+            <a:schemeClr val="lt1"/>
+          </a:fontRef>
+        </p:style>
+        <p:txBody>
+          <a:bodyPr rtlCol="0" anchor="ctr"/>
+          <a:lstStyle/>
+          <a:p>
+            <a:pPr algn="ctr"/>
+            <a:r>
+              <a:rPr lang="en-US" altLang="ko-KR" b="1" dirty="0" smtClean="0">
+                <a:solidFill>
+                  <a:srgbClr val="FF0000"/>
+                </a:solidFill>
+              </a:rPr>
+              <a:t>3</a:t>
+            </a:r>
+            <a:endParaRPr lang="ko-KR" altLang="en-US" b="1" dirty="0">
+              <a:solidFill>
+                <a:srgbClr val="FF0000"/>
+              </a:solidFill>
+            </a:endParaRPr>
+          </a:p>
+        </p:txBody>
+      </p:sp>
+      <p:sp>
+        <p:nvSpPr>
+          <p:cNvPr id="7" name="타원 6"/>
+          <p:cNvSpPr/>
+          <p:nvPr/>
+        </p:nvSpPr>
+        <p:spPr>
+          <a:xfrm>
+            <a:off x="5343288" y="4982308"/>
+            <a:ext cx="237392" cy="237392"/>
+          </a:xfrm>
+          <a:prstGeom prst="ellipse">
+            <a:avLst/>
+          </a:prstGeom>
+          <a:noFill/>
+          <a:ln w="28575">
+            <a:solidFill>
+              <a:srgbClr val="FF0000"/>
+            </a:solidFill>
+          </a:ln>
+        </p:spPr>
+        <p:style>
+          <a:lnRef idx="2">
+            <a:schemeClr val="accent1">
+              <a:shade val="50000"/>
+            </a:schemeClr>
+          </a:lnRef>
+          <a:fillRef idx="1">
+            <a:schemeClr val="accent1"/>
+          </a:fillRef>
+          <a:effectRef idx="0">
+            <a:schemeClr val="accent1"/>
+          </a:effectRef>
+          <a:fontRef idx="minor">
+            <a:schemeClr val="lt1"/>
+          </a:fontRef>
+        </p:style>
+        <p:txBody>
+          <a:bodyPr rtlCol="0" anchor="ctr"/>
+          <a:lstStyle/>
+          <a:p>
+            <a:pPr algn="ctr"/>
+            <a:r>
+              <a:rPr lang="en-US" altLang="ko-KR" b="1" dirty="0" smtClean="0">
+                <a:solidFill>
+                  <a:srgbClr val="FF0000"/>
+                </a:solidFill>
+              </a:rPr>
+              <a:t>3</a:t>
+            </a:r>
+            <a:endParaRPr lang="ko-KR" altLang="en-US" b="1" dirty="0">
+              <a:solidFill>
+                <a:srgbClr val="FF0000"/>
+              </a:solidFill>
+            </a:endParaRPr>
+          </a:p>
+        </p:txBody>
+      </p:sp>
+      <p:sp>
+        <p:nvSpPr>
+          <p:cNvPr id="8" name="TextBox 7"/>
+          <p:cNvSpPr txBox="1"/>
+          <p:nvPr/>
+        </p:nvSpPr>
+        <p:spPr>
+          <a:xfrm>
+            <a:off x="5549790" y="4942521"/>
+            <a:ext cx="6642209" cy="646331"/>
+          </a:xfrm>
+          <a:prstGeom prst="rect">
+            <a:avLst/>
+          </a:prstGeom>
+          <a:noFill/>
+        </p:spPr>
+        <p:txBody>
+          <a:bodyPr wrap="square" rtlCol="0">
+            <a:spAutoFit/>
+          </a:bodyPr>
+          <a:lstStyle/>
+          <a:p>
+            <a:r>
+              <a:rPr lang="ko-KR" altLang="en-US" b="1" dirty="0" smtClean="0"/>
+              <a:t>채팅 알림</a:t>
+            </a:r>
+            <a:endParaRPr lang="en-US" altLang="ko-KR" b="1" dirty="0" smtClean="0"/>
+          </a:p>
+          <a:p>
+            <a:pPr marL="342900" indent="-342900">
+              <a:buAutoNum type="arabicPeriod"/>
+            </a:pPr>
+            <a:r>
+              <a:rPr lang="ko-KR" altLang="en-US" b="1" dirty="0" err="1" smtClean="0"/>
+              <a:t>채팅창</a:t>
+            </a:r>
+            <a:r>
+              <a:rPr lang="ko-KR" altLang="en-US" b="1" dirty="0" smtClean="0"/>
+              <a:t> 비활성화 중 채팅 수신 시에 신규 메시지 </a:t>
+            </a:r>
+            <a:r>
+              <a:rPr lang="ko-KR" altLang="en-US" b="1" dirty="0" err="1" smtClean="0"/>
+              <a:t>뱃지</a:t>
+            </a:r>
+            <a:r>
+              <a:rPr lang="ko-KR" altLang="en-US" b="1" dirty="0" smtClean="0"/>
+              <a:t> 알림</a:t>
+            </a:r>
+            <a:endParaRPr lang="en-US" altLang="ko-KR" b="1" dirty="0" smtClean="0"/>
+          </a:p>
+        </p:txBody>
+      </p:sp>
+      <p:sp>
+        <p:nvSpPr>
+          <p:cNvPr id="9" name="모서리가 둥근 직사각형 8"/>
+          <p:cNvSpPr/>
+          <p:nvPr/>
+        </p:nvSpPr>
+        <p:spPr>
+          <a:xfrm>
+            <a:off x="1061787" y="323850"/>
+            <a:ext cx="3248526" cy="1028700"/>
           </a:xfrm>
           <a:prstGeom prst="roundRect">
-            <a:avLst>
-              <a:gd name="adj" fmla="val 10761"/>
-            </a:avLst>
+            <a:avLst/>
           </a:prstGeom>
           <a:noFill/>
           <a:ln w="57150">
@@ -4210,12 +4135,12 @@
         </p:nvSpPr>
         <p:spPr>
           <a:xfrm>
-            <a:off x="2924175" y="2009775"/>
-            <a:ext cx="866775" cy="381303"/>
+            <a:off x="1048784" y="1485900"/>
+            <a:ext cx="3252003" cy="2038350"/>
           </a:xfrm>
           <a:prstGeom prst="roundRect">
             <a:avLst>
-              <a:gd name="adj" fmla="val 10761"/>
+              <a:gd name="adj" fmla="val 7321"/>
             </a:avLst>
           </a:prstGeom>
           <a:noFill/>
@@ -4257,8 +4182,8 @@
         </p:nvSpPr>
         <p:spPr>
           <a:xfrm>
-            <a:off x="4499461" y="2081730"/>
-            <a:ext cx="245034" cy="237392"/>
+            <a:off x="5343288" y="893530"/>
+            <a:ext cx="237392" cy="237392"/>
           </a:xfrm>
           <a:prstGeom prst="ellipse">
             <a:avLst/>
@@ -4315,8 +4240,8 @@
         </p:nvSpPr>
         <p:spPr>
           <a:xfrm>
-            <a:off x="4499461" y="3645468"/>
-            <a:ext cx="245034" cy="237392"/>
+            <a:off x="5348155" y="3058128"/>
+            <a:ext cx="237392" cy="237392"/>
           </a:xfrm>
           <a:prstGeom prst="ellipse">
             <a:avLst/>
@@ -4367,14 +4292,172 @@
       </p:sp>
       <p:sp>
         <p:nvSpPr>
-          <p:cNvPr id="14" name="타원 13"/>
+          <p:cNvPr id="14" name="TextBox 13"/>
+          <p:cNvSpPr txBox="1"/>
+          <p:nvPr/>
+        </p:nvSpPr>
+        <p:spPr>
+          <a:xfrm>
+            <a:off x="5580682" y="849840"/>
+            <a:ext cx="5296868" cy="1200329"/>
+          </a:xfrm>
+          <a:prstGeom prst="rect">
+            <a:avLst/>
+          </a:prstGeom>
+          <a:noFill/>
+        </p:spPr>
+        <p:txBody>
+          <a:bodyPr wrap="square" rtlCol="0">
+            <a:spAutoFit/>
+          </a:bodyPr>
+          <a:lstStyle/>
+          <a:p>
+            <a:r>
+              <a:rPr lang="ko-KR" altLang="en-US" b="1" dirty="0" smtClean="0"/>
+              <a:t>검색기능</a:t>
+            </a:r>
+            <a:endParaRPr lang="en-US" altLang="ko-KR" b="1" dirty="0" smtClean="0"/>
+          </a:p>
+          <a:p>
+            <a:pPr marL="342900" indent="-342900">
+              <a:buAutoNum type="arabicPeriod"/>
+            </a:pPr>
+            <a:r>
+              <a:rPr lang="ko-KR" altLang="en-US" b="1" dirty="0" err="1" smtClean="0"/>
+              <a:t>태그별</a:t>
+            </a:r>
+            <a:r>
+              <a:rPr lang="ko-KR" altLang="en-US" b="1" dirty="0" smtClean="0"/>
+              <a:t> 검색 가능</a:t>
+            </a:r>
+            <a:endParaRPr lang="en-US" altLang="ko-KR" b="1" dirty="0" smtClean="0"/>
+          </a:p>
+          <a:p>
+            <a:pPr marL="342900" indent="-342900">
+              <a:buAutoNum type="arabicPeriod"/>
+            </a:pPr>
+            <a:r>
+              <a:rPr lang="ko-KR" altLang="en-US" b="1" dirty="0" smtClean="0"/>
+              <a:t>날짜</a:t>
+            </a:r>
+            <a:r>
+              <a:rPr lang="en-US" altLang="ko-KR" b="1" dirty="0" smtClean="0"/>
+              <a:t>(</a:t>
+            </a:r>
+            <a:r>
+              <a:rPr lang="ko-KR" altLang="en-US" b="1" dirty="0" smtClean="0"/>
+              <a:t>월</a:t>
+            </a:r>
+            <a:r>
+              <a:rPr lang="en-US" altLang="ko-KR" b="1" dirty="0" smtClean="0"/>
+              <a:t>)</a:t>
+            </a:r>
+            <a:r>
+              <a:rPr lang="ko-KR" altLang="en-US" b="1" dirty="0" smtClean="0"/>
+              <a:t>별 검색 가능</a:t>
+            </a:r>
+            <a:endParaRPr lang="en-US" altLang="ko-KR" b="1" dirty="0" smtClean="0"/>
+          </a:p>
+          <a:p>
+            <a:pPr marL="342900" indent="-342900">
+              <a:buAutoNum type="arabicPeriod"/>
+            </a:pPr>
+            <a:r>
+              <a:rPr lang="ko-KR" altLang="en-US" b="1" dirty="0" err="1" smtClean="0"/>
+              <a:t>검색창에</a:t>
+            </a:r>
+            <a:r>
+              <a:rPr lang="ko-KR" altLang="en-US" b="1" dirty="0" smtClean="0"/>
+              <a:t> 내용 입력 후 검색 클릭</a:t>
+            </a:r>
+            <a:endParaRPr lang="en-US" altLang="ko-KR" b="1" dirty="0" smtClean="0"/>
+          </a:p>
+        </p:txBody>
+      </p:sp>
+      <p:sp>
+        <p:nvSpPr>
+          <p:cNvPr id="15" name="TextBox 14"/>
+          <p:cNvSpPr txBox="1"/>
+          <p:nvPr/>
+        </p:nvSpPr>
+        <p:spPr>
+          <a:xfrm>
+            <a:off x="5580681" y="3007251"/>
+            <a:ext cx="5106370" cy="923330"/>
+          </a:xfrm>
+          <a:prstGeom prst="rect">
+            <a:avLst/>
+          </a:prstGeom>
+          <a:noFill/>
+        </p:spPr>
+        <p:txBody>
+          <a:bodyPr wrap="square" rtlCol="0">
+            <a:spAutoFit/>
+          </a:bodyPr>
+          <a:lstStyle/>
+          <a:p>
+            <a:r>
+              <a:rPr lang="ko-KR" altLang="en-US" b="1" dirty="0" smtClean="0"/>
+              <a:t>앨범 사진</a:t>
+            </a:r>
+            <a:endParaRPr lang="en-US" altLang="ko-KR" b="1" dirty="0" smtClean="0"/>
+          </a:p>
+          <a:p>
+            <a:pPr marL="342900" indent="-342900">
+              <a:buAutoNum type="arabicPeriod"/>
+            </a:pPr>
+            <a:r>
+              <a:rPr lang="ko-KR" altLang="en-US" b="1" dirty="0" smtClean="0"/>
+              <a:t>등록된 </a:t>
+            </a:r>
+            <a:r>
+              <a:rPr lang="ko-KR" altLang="en-US" b="1" dirty="0" err="1" smtClean="0"/>
+              <a:t>대표사진</a:t>
+            </a:r>
+            <a:r>
+              <a:rPr lang="en-US" altLang="ko-KR" b="1" dirty="0" smtClean="0"/>
+              <a:t>, </a:t>
+            </a:r>
+            <a:r>
+              <a:rPr lang="ko-KR" altLang="en-US" b="1" dirty="0" smtClean="0"/>
+              <a:t>해시태그</a:t>
+            </a:r>
+            <a:r>
+              <a:rPr lang="en-US" altLang="ko-KR" b="1" dirty="0" smtClean="0"/>
+              <a:t>, </a:t>
+            </a:r>
+            <a:r>
+              <a:rPr lang="ko-KR" altLang="en-US" b="1" dirty="0" smtClean="0"/>
+              <a:t>날짜가 표시</a:t>
+            </a:r>
+            <a:endParaRPr lang="en-US" altLang="ko-KR" b="1" dirty="0" smtClean="0"/>
+          </a:p>
+          <a:p>
+            <a:pPr marL="342900" indent="-342900">
+              <a:buAutoNum type="arabicPeriod"/>
+            </a:pPr>
+            <a:r>
+              <a:rPr lang="ko-KR" altLang="en-US" b="1" dirty="0" err="1" smtClean="0"/>
+              <a:t>클릭시</a:t>
+            </a:r>
+            <a:r>
+              <a:rPr lang="ko-KR" altLang="en-US" b="1" dirty="0" smtClean="0"/>
+              <a:t> 해당 앨범 상세보기 페이지로 이동</a:t>
+            </a:r>
+            <a:endParaRPr lang="en-US" altLang="ko-KR" b="1" dirty="0" smtClean="0"/>
+          </a:p>
+        </p:txBody>
+      </p:sp>
+      <p:sp>
+        <p:nvSpPr>
+          <p:cNvPr id="16" name="타원 15"/>
           <p:cNvSpPr/>
           <p:nvPr/>
         </p:nvSpPr>
         <p:spPr>
           <a:xfrm>
-            <a:off x="4500430" y="4920028"/>
-            <a:ext cx="245034" cy="237392"/>
+            <a:off x="4441167" y="719504"/>
+            <a:ext cx="237392" cy="237392"/>
           </a:xfrm>
           <a:prstGeom prst="ellipse">
             <a:avLst/>
@@ -4413,7 +4496,7 @@
                   <a:srgbClr val="FF0000"/>
                 </a:solidFill>
               </a:rPr>
-              <a:t>3</a:t>
+              <a:t>1</a:t>
             </a:r>
             <a:endParaRPr lang="ko-KR" altLang="en-US" b="1" dirty="0">
               <a:solidFill>
@@ -4425,14 +4508,14 @@
       </p:sp>
       <p:sp>
         <p:nvSpPr>
-          <p:cNvPr id="15" name="타원 14"/>
+          <p:cNvPr id="17" name="타원 16"/>
           <p:cNvSpPr/>
           <p:nvPr/>
         </p:nvSpPr>
         <p:spPr>
           <a:xfrm>
-            <a:off x="5395780" y="4351780"/>
-            <a:ext cx="245034" cy="237392"/>
+            <a:off x="4441167" y="2386379"/>
+            <a:ext cx="237392" cy="237392"/>
           </a:xfrm>
           <a:prstGeom prst="ellipse">
             <a:avLst/>
@@ -4471,7 +4554,7 @@
                   <a:srgbClr val="FF0000"/>
                 </a:solidFill>
               </a:rPr>
-              <a:t>3</a:t>
+              <a:t>2</a:t>
             </a:r>
             <a:endParaRPr lang="ko-KR" altLang="en-US" b="1" dirty="0">
               <a:solidFill>
@@ -4481,97 +4564,10 @@
           </a:p>
         </p:txBody>
       </p:sp>
-      <p:sp>
-        <p:nvSpPr>
-          <p:cNvPr id="16" name="TextBox 15"/>
-          <p:cNvSpPr txBox="1"/>
-          <p:nvPr/>
-        </p:nvSpPr>
-        <p:spPr>
-          <a:xfrm>
-            <a:off x="5628306" y="4310428"/>
-            <a:ext cx="6163644" cy="1200329"/>
-          </a:xfrm>
-          <a:prstGeom prst="rect">
-            <a:avLst/>
-          </a:prstGeom>
-          <a:noFill/>
-        </p:spPr>
-        <p:txBody>
-          <a:bodyPr wrap="square" rtlCol="0">
-            <a:spAutoFit/>
-          </a:bodyPr>
-          <a:lstStyle/>
-          <a:p>
-            <a:r>
-              <a:rPr lang="ko-KR" altLang="en-US" b="1" dirty="0" smtClean="0"/>
-              <a:t>일정 등록</a:t>
-            </a:r>
-            <a:r>
-              <a:rPr lang="en-US" altLang="ko-KR" b="1" dirty="0" smtClean="0"/>
-              <a:t>, </a:t>
-            </a:r>
-            <a:r>
-              <a:rPr lang="ko-KR" altLang="en-US" b="1" dirty="0" smtClean="0"/>
-              <a:t>조회</a:t>
-            </a:r>
-          </a:p>
-          <a:p>
-            <a:pPr marL="342900" indent="-342900">
-              <a:buAutoNum type="arabicPeriod"/>
-            </a:pPr>
-            <a:r>
-              <a:rPr lang="ko-KR" altLang="en-US" b="1" dirty="0" err="1" smtClean="0"/>
-              <a:t>선택일에</a:t>
-            </a:r>
-            <a:r>
-              <a:rPr lang="ko-KR" altLang="en-US" b="1" dirty="0" smtClean="0"/>
-              <a:t> 등록된 일정 조회</a:t>
-            </a:r>
-            <a:endParaRPr lang="en-US" altLang="ko-KR" b="1" dirty="0" smtClean="0"/>
-          </a:p>
-          <a:p>
-            <a:pPr marL="342900" indent="-342900">
-              <a:buAutoNum type="arabicPeriod"/>
-            </a:pPr>
-            <a:r>
-              <a:rPr lang="ko-KR" altLang="en-US" b="1" dirty="0" err="1" smtClean="0"/>
-              <a:t>클릭시</a:t>
-            </a:r>
-            <a:r>
-              <a:rPr lang="ko-KR" altLang="en-US" b="1" dirty="0" smtClean="0"/>
-              <a:t> 일정 상세 조회 페이지로 이동</a:t>
-            </a:r>
-            <a:endParaRPr lang="en-US" altLang="ko-KR" b="1" dirty="0" smtClean="0"/>
-          </a:p>
-          <a:p>
-            <a:pPr marL="342900" indent="-342900">
-              <a:buAutoNum type="arabicPeriod"/>
-            </a:pPr>
-            <a:r>
-              <a:rPr lang="en-US" altLang="ko-KR" b="1" dirty="0" smtClean="0"/>
-              <a:t>+</a:t>
-            </a:r>
-            <a:r>
-              <a:rPr lang="ko-KR" altLang="en-US" b="1" dirty="0" smtClean="0"/>
-              <a:t>버튼 </a:t>
-            </a:r>
-            <a:r>
-              <a:rPr lang="ko-KR" altLang="en-US" b="1" dirty="0" err="1" smtClean="0"/>
-              <a:t>클릭시</a:t>
-            </a:r>
-            <a:r>
-              <a:rPr lang="ko-KR" altLang="en-US" b="1" dirty="0" smtClean="0"/>
-              <a:t> 일정 생성 페이지로 이동</a:t>
-            </a:r>
-            <a:endParaRPr lang="en-US" altLang="ko-KR" b="1" dirty="0" smtClean="0"/>
-          </a:p>
-        </p:txBody>
-      </p:sp>
     </p:spTree>
     <p:extLst>
       <p:ext uri="{BB962C8B-B14F-4D97-AF65-F5344CB8AC3E}">
-        <p14:creationId xmlns:p14="http://schemas.microsoft.com/office/powerpoint/2010/main" val="1581961400"/>
+        <p14:creationId xmlns:p14="http://schemas.microsoft.com/office/powerpoint/2010/main" val="2827074898"/>
       </p:ext>
     </p:extLst>
   </p:cSld>
@@ -4607,7 +4603,7 @@
       </p:grpSpPr>
       <p:pic>
         <p:nvPicPr>
-          <p:cNvPr id="4" name="그림 3"/>
+          <p:cNvPr id="2" name="그림 1"/>
           <p:cNvPicPr>
             <a:picLocks noChangeAspect="1"/>
           </p:cNvPicPr>
@@ -4627,7 +4623,7 @@
         </p:blipFill>
         <p:spPr>
           <a:xfrm>
-            <a:off x="1061787" y="0"/>
+            <a:off x="1123950" y="9395"/>
             <a:ext cx="3248526" cy="6858000"/>
           </a:xfrm>
           <a:prstGeom prst="rect">
@@ -4637,14 +4633,14 @@
       </p:pic>
       <p:sp>
         <p:nvSpPr>
-          <p:cNvPr id="5" name="모서리가 둥근 직사각형 4"/>
+          <p:cNvPr id="9" name="모서리가 둥근 직사각형 8"/>
           <p:cNvSpPr/>
           <p:nvPr/>
         </p:nvSpPr>
         <p:spPr>
           <a:xfrm>
-            <a:off x="1785101" y="5981700"/>
-            <a:ext cx="576628" cy="499696"/>
+            <a:off x="1105422" y="719373"/>
+            <a:ext cx="3267054" cy="2287747"/>
           </a:xfrm>
           <a:prstGeom prst="roundRect">
             <a:avLst/>
@@ -4682,185 +4678,19 @@
       </p:sp>
       <p:sp>
         <p:nvSpPr>
-          <p:cNvPr id="6" name="타원 5"/>
+          <p:cNvPr id="11" name="모서리가 둥근 직사각형 10"/>
           <p:cNvSpPr/>
           <p:nvPr/>
         </p:nvSpPr>
         <p:spPr>
           <a:xfrm>
-            <a:off x="2445181" y="6112852"/>
-            <a:ext cx="237392" cy="237392"/>
-          </a:xfrm>
-          <a:prstGeom prst="ellipse">
-            <a:avLst/>
-          </a:prstGeom>
-          <a:noFill/>
-          <a:ln w="28575">
-            <a:solidFill>
-              <a:srgbClr val="FF0000"/>
-            </a:solidFill>
-          </a:ln>
-        </p:spPr>
-        <p:style>
-          <a:lnRef idx="2">
-            <a:schemeClr val="accent1">
-              <a:shade val="50000"/>
-            </a:schemeClr>
-          </a:lnRef>
-          <a:fillRef idx="1">
-            <a:schemeClr val="accent1"/>
-          </a:fillRef>
-          <a:effectRef idx="0">
-            <a:schemeClr val="accent1"/>
-          </a:effectRef>
-          <a:fontRef idx="minor">
-            <a:schemeClr val="lt1"/>
-          </a:fontRef>
-        </p:style>
-        <p:txBody>
-          <a:bodyPr rtlCol="0" anchor="ctr"/>
-          <a:lstStyle/>
-          <a:p>
-            <a:pPr algn="ctr"/>
-            <a:r>
-              <a:rPr lang="en-US" altLang="ko-KR" b="1" dirty="0" smtClean="0">
-                <a:solidFill>
-                  <a:srgbClr val="FF0000"/>
-                </a:solidFill>
-              </a:rPr>
-              <a:t>3</a:t>
-            </a:r>
-            <a:endParaRPr lang="ko-KR" altLang="en-US" b="1" dirty="0">
-              <a:solidFill>
-                <a:srgbClr val="FF0000"/>
-              </a:solidFill>
-            </a:endParaRPr>
-          </a:p>
-        </p:txBody>
-      </p:sp>
-      <p:sp>
-        <p:nvSpPr>
-          <p:cNvPr id="7" name="타원 6"/>
-          <p:cNvSpPr/>
-          <p:nvPr/>
-        </p:nvSpPr>
-        <p:spPr>
-          <a:xfrm>
-            <a:off x="5343288" y="4982308"/>
-            <a:ext cx="237392" cy="237392"/>
-          </a:xfrm>
-          <a:prstGeom prst="ellipse">
-            <a:avLst/>
-          </a:prstGeom>
-          <a:noFill/>
-          <a:ln w="28575">
-            <a:solidFill>
-              <a:srgbClr val="FF0000"/>
-            </a:solidFill>
-          </a:ln>
-        </p:spPr>
-        <p:style>
-          <a:lnRef idx="2">
-            <a:schemeClr val="accent1">
-              <a:shade val="50000"/>
-            </a:schemeClr>
-          </a:lnRef>
-          <a:fillRef idx="1">
-            <a:schemeClr val="accent1"/>
-          </a:fillRef>
-          <a:effectRef idx="0">
-            <a:schemeClr val="accent1"/>
-          </a:effectRef>
-          <a:fontRef idx="minor">
-            <a:schemeClr val="lt1"/>
-          </a:fontRef>
-        </p:style>
-        <p:txBody>
-          <a:bodyPr rtlCol="0" anchor="ctr"/>
-          <a:lstStyle/>
-          <a:p>
-            <a:pPr algn="ctr"/>
-            <a:r>
-              <a:rPr lang="en-US" altLang="ko-KR" b="1" dirty="0" smtClean="0">
-                <a:solidFill>
-                  <a:srgbClr val="FF0000"/>
-                </a:solidFill>
-              </a:rPr>
-              <a:t>3</a:t>
-            </a:r>
-            <a:endParaRPr lang="ko-KR" altLang="en-US" b="1" dirty="0">
-              <a:solidFill>
-                <a:srgbClr val="FF0000"/>
-              </a:solidFill>
-            </a:endParaRPr>
-          </a:p>
-        </p:txBody>
-      </p:sp>
-      <p:sp>
-        <p:nvSpPr>
-          <p:cNvPr id="8" name="TextBox 7"/>
-          <p:cNvSpPr txBox="1"/>
-          <p:nvPr/>
-        </p:nvSpPr>
-        <p:spPr>
-          <a:xfrm>
-            <a:off x="5549790" y="4942521"/>
-            <a:ext cx="6642209" cy="646331"/>
-          </a:xfrm>
-          <a:prstGeom prst="rect">
-            <a:avLst/>
-          </a:prstGeom>
-          <a:noFill/>
-        </p:spPr>
-        <p:txBody>
-          <a:bodyPr wrap="square" rtlCol="0">
-            <a:spAutoFit/>
-          </a:bodyPr>
-          <a:lstStyle/>
-          <a:p>
-            <a:r>
-              <a:rPr lang="ko-KR" altLang="en-US" b="1" dirty="0" smtClean="0"/>
-              <a:t>채팅 알림</a:t>
-            </a:r>
-            <a:endParaRPr lang="en-US" altLang="ko-KR" b="1" dirty="0" smtClean="0"/>
-          </a:p>
-          <a:p>
-            <a:pPr marL="342900" indent="-342900">
-              <a:buAutoNum type="arabicPeriod"/>
-            </a:pPr>
-            <a:r>
-              <a:rPr lang="ko-KR" altLang="en-US" b="1" dirty="0" err="1" smtClean="0"/>
-              <a:t>채팅창</a:t>
-            </a:r>
-            <a:r>
-              <a:rPr lang="ko-KR" altLang="en-US" b="1" dirty="0" smtClean="0"/>
-              <a:t> 비활성화 중 채팅 수신 시에 신규 메시지 </a:t>
-            </a:r>
-            <a:r>
-              <a:rPr lang="ko-KR" altLang="en-US" b="1" dirty="0" err="1" smtClean="0"/>
-              <a:t>뱃지</a:t>
-            </a:r>
-            <a:r>
-              <a:rPr lang="ko-KR" altLang="en-US" b="1" dirty="0" smtClean="0"/>
-              <a:t> 알림</a:t>
-            </a:r>
-            <a:endParaRPr lang="en-US" altLang="ko-KR" b="1" dirty="0" smtClean="0"/>
-          </a:p>
-        </p:txBody>
-      </p:sp>
-      <p:sp>
-        <p:nvSpPr>
-          <p:cNvPr id="9" name="모서리가 둥근 직사각형 8"/>
-          <p:cNvSpPr/>
-          <p:nvPr/>
-        </p:nvSpPr>
-        <p:spPr>
-          <a:xfrm>
-            <a:off x="1061787" y="323850"/>
-            <a:ext cx="3248526" cy="1028700"/>
+            <a:off x="1112947" y="3068438"/>
+            <a:ext cx="3259529" cy="2913132"/>
           </a:xfrm>
           <a:prstGeom prst="roundRect">
-            <a:avLst/>
+            <a:avLst>
+              <a:gd name="adj" fmla="val 7321"/>
+            </a:avLst>
           </a:prstGeom>
           <a:noFill/>
           <a:ln w="57150">
@@ -4895,60 +4725,13 @@
       </p:sp>
       <p:sp>
         <p:nvSpPr>
-          <p:cNvPr id="11" name="모서리가 둥근 직사각형 10"/>
-          <p:cNvSpPr/>
-          <p:nvPr/>
-        </p:nvSpPr>
-        <p:spPr>
-          <a:xfrm>
-            <a:off x="1048784" y="1485900"/>
-            <a:ext cx="3252003" cy="2038350"/>
-          </a:xfrm>
-          <a:prstGeom prst="roundRect">
-            <a:avLst>
-              <a:gd name="adj" fmla="val 7321"/>
-            </a:avLst>
-          </a:prstGeom>
-          <a:noFill/>
-          <a:ln w="57150">
-            <a:solidFill>
-              <a:srgbClr val="FF0000"/>
-            </a:solidFill>
-          </a:ln>
-          <a:effectLst/>
-        </p:spPr>
-        <p:style>
-          <a:lnRef idx="2">
-            <a:schemeClr val="accent2"/>
-          </a:lnRef>
-          <a:fillRef idx="1">
-            <a:schemeClr val="lt1"/>
-          </a:fillRef>
-          <a:effectRef idx="0">
-            <a:schemeClr val="accent2"/>
-          </a:effectRef>
-          <a:fontRef idx="minor">
-            <a:schemeClr val="dk1"/>
-          </a:fontRef>
-        </p:style>
-        <p:txBody>
-          <a:bodyPr rtlCol="0" anchor="ctr"/>
-          <a:lstStyle/>
-          <a:p>
-            <a:pPr algn="ctr"/>
-            <a:endParaRPr lang="ko-KR" altLang="en-US"/>
-          </a:p>
-        </p:txBody>
-      </p:sp>
-      <p:sp>
-        <p:nvSpPr>
           <p:cNvPr id="12" name="타원 11"/>
           <p:cNvSpPr/>
           <p:nvPr/>
         </p:nvSpPr>
         <p:spPr>
           <a:xfrm>
-            <a:off x="5343288" y="893530"/>
+            <a:off x="5924313" y="1692422"/>
             <a:ext cx="237392" cy="237392"/>
           </a:xfrm>
           <a:prstGeom prst="ellipse">
@@ -5006,7 +4789,7 @@
         </p:nvSpPr>
         <p:spPr>
           <a:xfrm>
-            <a:off x="5348155" y="3058128"/>
+            <a:off x="5929180" y="3857020"/>
             <a:ext cx="237392" cy="237392"/>
           </a:xfrm>
           <a:prstGeom prst="ellipse">
@@ -5064,8 +4847,8 @@
         </p:nvSpPr>
         <p:spPr>
           <a:xfrm>
-            <a:off x="5580682" y="849840"/>
-            <a:ext cx="5296868" cy="1200329"/>
+            <a:off x="6161707" y="1648732"/>
+            <a:ext cx="5296868" cy="646331"/>
           </a:xfrm>
           <a:prstGeom prst="rect">
             <a:avLst/>
@@ -5080,7 +4863,7 @@
           <a:p>
             <a:r>
               <a:rPr lang="ko-KR" altLang="en-US" b="1" dirty="0" smtClean="0"/>
-              <a:t>검색기능</a:t>
+              <a:t>선택 사진</a:t>
             </a:r>
             <a:endParaRPr lang="en-US" altLang="ko-KR" b="1" dirty="0" smtClean="0"/>
           </a:p>
@@ -5089,12 +4872,41 @@
               <a:buAutoNum type="arabicPeriod"/>
             </a:pPr>
             <a:r>
-              <a:rPr lang="ko-KR" altLang="en-US" b="1" dirty="0" err="1" smtClean="0"/>
-              <a:t>태그별</a:t>
-            </a:r>
-            <a:r>
-              <a:rPr lang="ko-KR" altLang="en-US" b="1" dirty="0" smtClean="0"/>
-              <a:t> 검색 가능</a:t>
+              <a:rPr lang="ko-KR" altLang="en-US" b="1" dirty="0" smtClean="0"/>
+              <a:t>선택한 사진이 표시 됨</a:t>
+            </a:r>
+            <a:r>
+              <a:rPr lang="en-US" altLang="ko-KR" b="1" dirty="0" smtClean="0"/>
+              <a:t>.</a:t>
+            </a:r>
+          </a:p>
+        </p:txBody>
+      </p:sp>
+      <p:sp>
+        <p:nvSpPr>
+          <p:cNvPr id="15" name="TextBox 14"/>
+          <p:cNvSpPr txBox="1"/>
+          <p:nvPr/>
+        </p:nvSpPr>
+        <p:spPr>
+          <a:xfrm>
+            <a:off x="6161706" y="3806143"/>
+            <a:ext cx="5106370" cy="1200329"/>
+          </a:xfrm>
+          <a:prstGeom prst="rect">
+            <a:avLst/>
+          </a:prstGeom>
+          <a:noFill/>
+        </p:spPr>
+        <p:txBody>
+          <a:bodyPr wrap="square" rtlCol="0">
+            <a:spAutoFit/>
+          </a:bodyPr>
+          <a:lstStyle/>
+          <a:p>
+            <a:r>
+              <a:rPr lang="ko-KR" altLang="en-US" b="1" dirty="0" smtClean="0"/>
+              <a:t>등록 사진 선택</a:t>
             </a:r>
             <a:endParaRPr lang="en-US" altLang="ko-KR" b="1" dirty="0" smtClean="0"/>
           </a:p>
@@ -5104,23 +4916,7 @@
             </a:pPr>
             <a:r>
               <a:rPr lang="ko-KR" altLang="en-US" b="1" dirty="0" smtClean="0"/>
-              <a:t>날짜</a:t>
-            </a:r>
-            <a:r>
-              <a:rPr lang="en-US" altLang="ko-KR" b="1" dirty="0" smtClean="0"/>
-              <a:t>(</a:t>
-            </a:r>
-            <a:r>
-              <a:rPr lang="ko-KR" altLang="en-US" b="1" dirty="0" smtClean="0"/>
-              <a:t>월</a:t>
-            </a:r>
-            <a:r>
-              <a:rPr lang="en-US" altLang="ko-KR" b="1" dirty="0" smtClean="0"/>
-              <a:t>)</a:t>
-            </a:r>
-            <a:r>
-              <a:rPr lang="ko-KR" altLang="en-US" b="1" dirty="0" smtClean="0"/>
-              <a:t>별 검색 가능</a:t>
+              <a:t>앨범에 등록할 사진 선택</a:t>
             </a:r>
             <a:endParaRPr lang="en-US" altLang="ko-KR" b="1" dirty="0" smtClean="0"/>
           </a:p>
@@ -5129,42 +4925,16 @@
               <a:buAutoNum type="arabicPeriod"/>
             </a:pPr>
             <a:r>
-              <a:rPr lang="ko-KR" altLang="en-US" b="1" dirty="0" err="1" smtClean="0"/>
-              <a:t>검색창에</a:t>
-            </a:r>
-            <a:r>
-              <a:rPr lang="ko-KR" altLang="en-US" b="1" dirty="0" smtClean="0"/>
-              <a:t> 내용 입력 후 검색 클릭</a:t>
-            </a:r>
-            <a:endParaRPr lang="en-US" altLang="ko-KR" b="1" dirty="0" smtClean="0"/>
-          </a:p>
-        </p:txBody>
-      </p:sp>
-      <p:sp>
-        <p:nvSpPr>
-          <p:cNvPr id="15" name="TextBox 14"/>
-          <p:cNvSpPr txBox="1"/>
-          <p:nvPr/>
-        </p:nvSpPr>
-        <p:spPr>
-          <a:xfrm>
-            <a:off x="5580681" y="3007251"/>
-            <a:ext cx="5106370" cy="923330"/>
-          </a:xfrm>
-          <a:prstGeom prst="rect">
-            <a:avLst/>
-          </a:prstGeom>
-          <a:noFill/>
-        </p:spPr>
-        <p:txBody>
-          <a:bodyPr wrap="square" rtlCol="0">
-            <a:spAutoFit/>
-          </a:bodyPr>
-          <a:lstStyle/>
-          <a:p>
-            <a:r>
-              <a:rPr lang="ko-KR" altLang="en-US" b="1" dirty="0" smtClean="0"/>
-              <a:t>앨범 사진</a:t>
+              <a:rPr lang="ko-KR" altLang="en-US" b="1" dirty="0" smtClean="0"/>
+              <a:t>최대 </a:t>
+            </a:r>
+            <a:r>
+              <a:rPr lang="en-US" altLang="ko-KR" b="1" dirty="0" smtClean="0"/>
+              <a:t>10</a:t>
+            </a:r>
+            <a:r>
+              <a:rPr lang="ko-KR" altLang="en-US" b="1" dirty="0" smtClean="0"/>
+              <a:t>장 선택 가능</a:t>
             </a:r>
             <a:endParaRPr lang="en-US" altLang="ko-KR" b="1" dirty="0" smtClean="0"/>
           </a:p>
@@ -5174,41 +4944,15 @@
             </a:pPr>
             <a:r>
               <a:rPr lang="ko-KR" altLang="en-US" b="1" dirty="0" smtClean="0"/>
-              <a:t>등록된 </a:t>
-            </a:r>
-            <a:r>
-              <a:rPr lang="ko-KR" altLang="en-US" b="1" dirty="0" err="1" smtClean="0"/>
-              <a:t>대표사진</a:t>
+              <a:t>한 사진에 </a:t>
             </a:r>
             <a:r>
               <a:rPr lang="en-US" altLang="ko-KR" b="1" dirty="0" smtClean="0"/>
-              <a:t>, </a:t>
-            </a:r>
-            <a:r>
-              <a:rPr lang="ko-KR" altLang="en-US" b="1" dirty="0" smtClean="0"/>
-              <a:t>해시태그</a:t>
-            </a:r>
-            <a:r>
-              <a:rPr lang="en-US" altLang="ko-KR" b="1" dirty="0" smtClean="0"/>
-              <a:t>, </a:t>
-            </a:r>
-            <a:r>
-              <a:rPr lang="ko-KR" altLang="en-US" b="1" dirty="0" smtClean="0"/>
-              <a:t>날짜가 표시</a:t>
-            </a:r>
-            <a:endParaRPr lang="en-US" altLang="ko-KR" b="1" dirty="0" smtClean="0"/>
-          </a:p>
-          <a:p>
-            <a:pPr marL="342900" indent="-342900">
-              <a:buAutoNum type="arabicPeriod"/>
-            </a:pPr>
-            <a:r>
-              <a:rPr lang="ko-KR" altLang="en-US" b="1" dirty="0" err="1" smtClean="0"/>
-              <a:t>클릭시</a:t>
-            </a:r>
-            <a:r>
-              <a:rPr lang="ko-KR" altLang="en-US" b="1" dirty="0" smtClean="0"/>
-              <a:t> 해당 앨범 상세보기 페이지로 이동</a:t>
+              <a:t>5MB </a:t>
+            </a:r>
+            <a:r>
+              <a:rPr lang="ko-KR" altLang="en-US" b="1" dirty="0" smtClean="0"/>
+              <a:t>까지 업로드 허용</a:t>
             </a:r>
             <a:endParaRPr lang="en-US" altLang="ko-KR" b="1" dirty="0" smtClean="0"/>
           </a:p>
@@ -5222,7 +4966,7 @@
         </p:nvSpPr>
         <p:spPr>
           <a:xfrm>
-            <a:off x="4441167" y="719504"/>
+            <a:off x="4481847" y="1744550"/>
             <a:ext cx="237392" cy="237392"/>
           </a:xfrm>
           <a:prstGeom prst="ellipse">
@@ -5280,7 +5024,7 @@
         </p:nvSpPr>
         <p:spPr>
           <a:xfrm>
-            <a:off x="4441167" y="2386379"/>
+            <a:off x="4481847" y="4406308"/>
             <a:ext cx="237392" cy="237392"/>
           </a:xfrm>
           <a:prstGeom prst="ellipse">
@@ -5333,7 +5077,7 @@
     </p:spTree>
     <p:extLst>
       <p:ext uri="{BB962C8B-B14F-4D97-AF65-F5344CB8AC3E}">
-        <p14:creationId xmlns:p14="http://schemas.microsoft.com/office/powerpoint/2010/main" val="2827074898"/>
+        <p14:creationId xmlns:p14="http://schemas.microsoft.com/office/powerpoint/2010/main" val="3027785379"/>
       </p:ext>
     </p:extLst>
   </p:cSld>
@@ -5369,7 +5113,7 @@
       </p:grpSpPr>
       <p:pic>
         <p:nvPicPr>
-          <p:cNvPr id="2" name="그림 1"/>
+          <p:cNvPr id="3" name="그림 2"/>
           <p:cNvPicPr>
             <a:picLocks noChangeAspect="1"/>
           </p:cNvPicPr>
@@ -5389,7 +5133,7 @@
         </p:blipFill>
         <p:spPr>
           <a:xfrm>
-            <a:off x="1123950" y="9395"/>
+            <a:off x="1100174" y="0"/>
             <a:ext cx="3248526" cy="6858000"/>
           </a:xfrm>
           <a:prstGeom prst="rect">
@@ -5405,11 +5149,13 @@
         </p:nvSpPr>
         <p:spPr>
           <a:xfrm>
-            <a:off x="1105422" y="719373"/>
-            <a:ext cx="3267054" cy="2287747"/>
+            <a:off x="1381603" y="2818963"/>
+            <a:ext cx="2656997" cy="1149718"/>
           </a:xfrm>
           <a:prstGeom prst="roundRect">
-            <a:avLst/>
+            <a:avLst>
+              <a:gd name="adj" fmla="val 0"/>
+            </a:avLst>
           </a:prstGeom>
           <a:noFill/>
           <a:ln w="57150">
@@ -5444,60 +5190,13 @@
       </p:sp>
       <p:sp>
         <p:nvSpPr>
-          <p:cNvPr id="11" name="모서리가 둥근 직사각형 10"/>
-          <p:cNvSpPr/>
-          <p:nvPr/>
-        </p:nvSpPr>
-        <p:spPr>
-          <a:xfrm>
-            <a:off x="1112947" y="3068438"/>
-            <a:ext cx="3259529" cy="2913132"/>
-          </a:xfrm>
-          <a:prstGeom prst="roundRect">
-            <a:avLst>
-              <a:gd name="adj" fmla="val 7321"/>
-            </a:avLst>
-          </a:prstGeom>
-          <a:noFill/>
-          <a:ln w="57150">
-            <a:solidFill>
-              <a:srgbClr val="FF0000"/>
-            </a:solidFill>
-          </a:ln>
-          <a:effectLst/>
-        </p:spPr>
-        <p:style>
-          <a:lnRef idx="2">
-            <a:schemeClr val="accent2"/>
-          </a:lnRef>
-          <a:fillRef idx="1">
-            <a:schemeClr val="lt1"/>
-          </a:fillRef>
-          <a:effectRef idx="0">
-            <a:schemeClr val="accent2"/>
-          </a:effectRef>
-          <a:fontRef idx="minor">
-            <a:schemeClr val="dk1"/>
-          </a:fontRef>
-        </p:style>
-        <p:txBody>
-          <a:bodyPr rtlCol="0" anchor="ctr"/>
-          <a:lstStyle/>
-          <a:p>
-            <a:pPr algn="ctr"/>
-            <a:endParaRPr lang="ko-KR" altLang="en-US"/>
-          </a:p>
-        </p:txBody>
-      </p:sp>
-      <p:sp>
-        <p:nvSpPr>
           <p:cNvPr id="12" name="타원 11"/>
           <p:cNvSpPr/>
           <p:nvPr/>
         </p:nvSpPr>
         <p:spPr>
           <a:xfrm>
-            <a:off x="5924313" y="1692422"/>
+            <a:off x="5752863" y="3053153"/>
             <a:ext cx="237392" cy="237392"/>
           </a:xfrm>
           <a:prstGeom prst="ellipse">
@@ -5549,13 +5248,87 @@
       </p:sp>
       <p:sp>
         <p:nvSpPr>
-          <p:cNvPr id="13" name="타원 12"/>
+          <p:cNvPr id="14" name="TextBox 13"/>
+          <p:cNvSpPr txBox="1"/>
+          <p:nvPr/>
+        </p:nvSpPr>
+        <p:spPr>
+          <a:xfrm>
+            <a:off x="5990257" y="3009463"/>
+            <a:ext cx="5296868" cy="923330"/>
+          </a:xfrm>
+          <a:prstGeom prst="rect">
+            <a:avLst/>
+          </a:prstGeom>
+          <a:noFill/>
+        </p:spPr>
+        <p:txBody>
+          <a:bodyPr wrap="square" rtlCol="0">
+            <a:spAutoFit/>
+          </a:bodyPr>
+          <a:lstStyle/>
+          <a:p>
+            <a:r>
+              <a:rPr lang="ko-KR" altLang="en-US" b="1" dirty="0" smtClean="0"/>
+              <a:t>앨범 수정</a:t>
+            </a:r>
+            <a:r>
+              <a:rPr lang="en-US" altLang="ko-KR" b="1" dirty="0" smtClean="0"/>
+              <a:t>, </a:t>
+            </a:r>
+            <a:r>
+              <a:rPr lang="ko-KR" altLang="en-US" b="1" dirty="0" smtClean="0"/>
+              <a:t>삭제 버튼</a:t>
+            </a:r>
+            <a:endParaRPr lang="en-US" altLang="ko-KR" b="1" dirty="0" smtClean="0"/>
+          </a:p>
+          <a:p>
+            <a:pPr marL="342900" indent="-342900">
+              <a:buAutoNum type="arabicPeriod"/>
+            </a:pPr>
+            <a:r>
+              <a:rPr lang="ko-KR" altLang="en-US" b="1" dirty="0" smtClean="0"/>
+              <a:t>앨범 수정 </a:t>
+            </a:r>
+            <a:r>
+              <a:rPr lang="ko-KR" altLang="en-US" b="1" dirty="0" err="1" smtClean="0"/>
+              <a:t>클릭시</a:t>
+            </a:r>
+            <a:r>
+              <a:rPr lang="ko-KR" altLang="en-US" b="1" dirty="0" smtClean="0"/>
+              <a:t> 수정 페이지로 이동</a:t>
+            </a:r>
+            <a:endParaRPr lang="en-US" altLang="ko-KR" b="1" dirty="0" smtClean="0"/>
+          </a:p>
+          <a:p>
+            <a:pPr marL="342900" indent="-342900">
+              <a:buAutoNum type="arabicPeriod"/>
+            </a:pPr>
+            <a:r>
+              <a:rPr lang="ko-KR" altLang="en-US" b="1" dirty="0" smtClean="0"/>
+              <a:t>앨범 삭제 </a:t>
+            </a:r>
+            <a:r>
+              <a:rPr lang="ko-KR" altLang="en-US" b="1" dirty="0" err="1" smtClean="0"/>
+              <a:t>클릭시</a:t>
+            </a:r>
+            <a:r>
+              <a:rPr lang="ko-KR" altLang="en-US" b="1" dirty="0" smtClean="0"/>
+              <a:t> 앨범 삭제</a:t>
+            </a:r>
+            <a:endParaRPr lang="en-US" altLang="ko-KR" b="1" dirty="0" smtClean="0"/>
+          </a:p>
+        </p:txBody>
+      </p:sp>
+      <p:sp>
+        <p:nvSpPr>
+          <p:cNvPr id="16" name="타원 15"/>
           <p:cNvSpPr/>
           <p:nvPr/>
         </p:nvSpPr>
         <p:spPr>
           <a:xfrm>
-            <a:off x="5929180" y="3857020"/>
+            <a:off x="4462530" y="3310304"/>
             <a:ext cx="237392" cy="237392"/>
           </a:xfrm>
           <a:prstGeom prst="ellipse">
@@ -5595,7 +5368,7 @@
                   <a:srgbClr val="FF0000"/>
                 </a:solidFill>
               </a:rPr>
-              <a:t>2</a:t>
+              <a:t>1</a:t>
             </a:r>
             <a:endParaRPr lang="ko-KR" altLang="en-US" b="1" dirty="0">
               <a:solidFill>
@@ -5605,245 +5378,10 @@
           </a:p>
         </p:txBody>
       </p:sp>
-      <p:sp>
-        <p:nvSpPr>
-          <p:cNvPr id="14" name="TextBox 13"/>
-          <p:cNvSpPr txBox="1"/>
-          <p:nvPr/>
-        </p:nvSpPr>
-        <p:spPr>
-          <a:xfrm>
-            <a:off x="6161707" y="1648732"/>
-            <a:ext cx="5296868" cy="646331"/>
-          </a:xfrm>
-          <a:prstGeom prst="rect">
-            <a:avLst/>
-          </a:prstGeom>
-          <a:noFill/>
-        </p:spPr>
-        <p:txBody>
-          <a:bodyPr wrap="square" rtlCol="0">
-            <a:spAutoFit/>
-          </a:bodyPr>
-          <a:lstStyle/>
-          <a:p>
-            <a:r>
-              <a:rPr lang="ko-KR" altLang="en-US" b="1" dirty="0" smtClean="0"/>
-              <a:t>선택 사진</a:t>
-            </a:r>
-            <a:endParaRPr lang="en-US" altLang="ko-KR" b="1" dirty="0" smtClean="0"/>
-          </a:p>
-          <a:p>
-            <a:pPr marL="342900" indent="-342900">
-              <a:buAutoNum type="arabicPeriod"/>
-            </a:pPr>
-            <a:r>
-              <a:rPr lang="ko-KR" altLang="en-US" b="1" dirty="0" smtClean="0"/>
-              <a:t>선택한 사진이 표시 됨</a:t>
-            </a:r>
-            <a:r>
-              <a:rPr lang="en-US" altLang="ko-KR" b="1" dirty="0" smtClean="0"/>
-              <a:t>.</a:t>
-            </a:r>
-          </a:p>
-        </p:txBody>
-      </p:sp>
-      <p:sp>
-        <p:nvSpPr>
-          <p:cNvPr id="15" name="TextBox 14"/>
-          <p:cNvSpPr txBox="1"/>
-          <p:nvPr/>
-        </p:nvSpPr>
-        <p:spPr>
-          <a:xfrm>
-            <a:off x="6161706" y="3806143"/>
-            <a:ext cx="5106370" cy="1200329"/>
-          </a:xfrm>
-          <a:prstGeom prst="rect">
-            <a:avLst/>
-          </a:prstGeom>
-          <a:noFill/>
-        </p:spPr>
-        <p:txBody>
-          <a:bodyPr wrap="square" rtlCol="0">
-            <a:spAutoFit/>
-          </a:bodyPr>
-          <a:lstStyle/>
-          <a:p>
-            <a:r>
-              <a:rPr lang="ko-KR" altLang="en-US" b="1" dirty="0" smtClean="0"/>
-              <a:t>등록 사진 선택</a:t>
-            </a:r>
-            <a:endParaRPr lang="en-US" altLang="ko-KR" b="1" dirty="0" smtClean="0"/>
-          </a:p>
-          <a:p>
-            <a:pPr marL="342900" indent="-342900">
-              <a:buAutoNum type="arabicPeriod"/>
-            </a:pPr>
-            <a:r>
-              <a:rPr lang="ko-KR" altLang="en-US" b="1" dirty="0" smtClean="0"/>
-              <a:t>앨범에 등록할 사진 선택</a:t>
-            </a:r>
-            <a:endParaRPr lang="en-US" altLang="ko-KR" b="1" dirty="0" smtClean="0"/>
-          </a:p>
-          <a:p>
-            <a:pPr marL="342900" indent="-342900">
-              <a:buAutoNum type="arabicPeriod"/>
-            </a:pPr>
-            <a:r>
-              <a:rPr lang="ko-KR" altLang="en-US" b="1" dirty="0" smtClean="0"/>
-              <a:t>최대 </a:t>
-            </a:r>
-            <a:r>
-              <a:rPr lang="en-US" altLang="ko-KR" b="1" dirty="0" smtClean="0"/>
-              <a:t>10</a:t>
-            </a:r>
-            <a:r>
-              <a:rPr lang="ko-KR" altLang="en-US" b="1" dirty="0" smtClean="0"/>
-              <a:t>장 선택 가능</a:t>
-            </a:r>
-            <a:endParaRPr lang="en-US" altLang="ko-KR" b="1" dirty="0" smtClean="0"/>
-          </a:p>
-          <a:p>
-            <a:pPr marL="342900" indent="-342900">
-              <a:buAutoNum type="arabicPeriod"/>
-            </a:pPr>
-            <a:r>
-              <a:rPr lang="ko-KR" altLang="en-US" b="1" dirty="0" smtClean="0"/>
-              <a:t>한 사진에 </a:t>
-            </a:r>
-            <a:r>
-              <a:rPr lang="en-US" altLang="ko-KR" b="1" dirty="0" smtClean="0"/>
-              <a:t>5MB </a:t>
-            </a:r>
-            <a:r>
-              <a:rPr lang="ko-KR" altLang="en-US" b="1" dirty="0" smtClean="0"/>
-              <a:t>까지 업로드 허용</a:t>
-            </a:r>
-            <a:endParaRPr lang="en-US" altLang="ko-KR" b="1" dirty="0" smtClean="0"/>
-          </a:p>
-        </p:txBody>
-      </p:sp>
-      <p:sp>
-        <p:nvSpPr>
-          <p:cNvPr id="16" name="타원 15"/>
-          <p:cNvSpPr/>
-          <p:nvPr/>
-        </p:nvSpPr>
-        <p:spPr>
-          <a:xfrm>
-            <a:off x="4481847" y="1744550"/>
-            <a:ext cx="237392" cy="237392"/>
-          </a:xfrm>
-          <a:prstGeom prst="ellipse">
-            <a:avLst/>
-          </a:prstGeom>
-          <a:noFill/>
-          <a:ln w="28575">
-            <a:solidFill>
-              <a:srgbClr val="FF0000"/>
-            </a:solidFill>
-          </a:ln>
-        </p:spPr>
-        <p:style>
-          <a:lnRef idx="2">
-            <a:schemeClr val="accent1">
-              <a:shade val="50000"/>
-            </a:schemeClr>
-          </a:lnRef>
-          <a:fillRef idx="1">
-            <a:schemeClr val="accent1"/>
-          </a:fillRef>
-          <a:effectRef idx="0">
-            <a:schemeClr val="accent1"/>
-          </a:effectRef>
-          <a:fontRef idx="minor">
-            <a:schemeClr val="lt1"/>
-          </a:fontRef>
-        </p:style>
-        <p:txBody>
-          <a:bodyPr rtlCol="0" anchor="ctr"/>
-          <a:lstStyle/>
-          <a:p>
-            <a:pPr algn="ctr"/>
-            <a:r>
-              <a:rPr lang="en-US" altLang="ko-KR" b="1" dirty="0" smtClean="0">
-                <a:solidFill>
-                  <a:srgbClr val="FF0000"/>
-                </a:solidFill>
-              </a:rPr>
-              <a:t>1</a:t>
-            </a:r>
-            <a:endParaRPr lang="ko-KR" altLang="en-US" b="1" dirty="0">
-              <a:solidFill>
-                <a:srgbClr val="FF0000"/>
-              </a:solidFill>
-            </a:endParaRPr>
-          </a:p>
-        </p:txBody>
-      </p:sp>
-      <p:sp>
-        <p:nvSpPr>
-          <p:cNvPr id="17" name="타원 16"/>
-          <p:cNvSpPr/>
-          <p:nvPr/>
-        </p:nvSpPr>
-        <p:spPr>
-          <a:xfrm>
-            <a:off x="4481847" y="4406308"/>
-            <a:ext cx="237392" cy="237392"/>
-          </a:xfrm>
-          <a:prstGeom prst="ellipse">
-            <a:avLst/>
-          </a:prstGeom>
-          <a:noFill/>
-          <a:ln w="28575">
-            <a:solidFill>
-              <a:srgbClr val="FF0000"/>
-            </a:solidFill>
-          </a:ln>
-        </p:spPr>
-        <p:style>
-          <a:lnRef idx="2">
-            <a:schemeClr val="accent1">
-              <a:shade val="50000"/>
-            </a:schemeClr>
-          </a:lnRef>
-          <a:fillRef idx="1">
-            <a:schemeClr val="accent1"/>
-          </a:fillRef>
-          <a:effectRef idx="0">
-            <a:schemeClr val="accent1"/>
-          </a:effectRef>
-          <a:fontRef idx="minor">
-            <a:schemeClr val="lt1"/>
-          </a:fontRef>
-        </p:style>
-        <p:txBody>
-          <a:bodyPr rtlCol="0" anchor="ctr"/>
-          <a:lstStyle/>
-          <a:p>
-            <a:pPr algn="ctr"/>
-            <a:r>
-              <a:rPr lang="en-US" altLang="ko-KR" b="1" dirty="0" smtClean="0">
-                <a:solidFill>
-                  <a:srgbClr val="FF0000"/>
-                </a:solidFill>
-              </a:rPr>
-              <a:t>2</a:t>
-            </a:r>
-            <a:endParaRPr lang="ko-KR" altLang="en-US" b="1" dirty="0">
-              <a:solidFill>
-                <a:srgbClr val="FF0000"/>
-              </a:solidFill>
-            </a:endParaRPr>
-          </a:p>
-        </p:txBody>
-      </p:sp>
     </p:spTree>
     <p:extLst>
       <p:ext uri="{BB962C8B-B14F-4D97-AF65-F5344CB8AC3E}">
-        <p14:creationId xmlns:p14="http://schemas.microsoft.com/office/powerpoint/2010/main" val="3027785379"/>
+        <p14:creationId xmlns:p14="http://schemas.microsoft.com/office/powerpoint/2010/main" val="635950635"/>
       </p:ext>
     </p:extLst>
   </p:cSld>
@@ -5879,310 +5417,6 @@
       </p:grpSpPr>
       <p:pic>
         <p:nvPicPr>
-          <p:cNvPr id="3" name="그림 2"/>
-          <p:cNvPicPr>
-            <a:picLocks noChangeAspect="1"/>
-          </p:cNvPicPr>
-          <p:nvPr/>
-        </p:nvPicPr>
-        <p:blipFill>
-          <a:blip r:embed="rId2" cstate="print">
-            <a:extLst>
-              <a:ext uri="{28A0092B-C50C-407E-A947-70E740481C1C}">
-                <a14:useLocalDpi xmlns:a14="http://schemas.microsoft.com/office/drawing/2010/main" val="0"/>
-              </a:ext>
-            </a:extLst>
-          </a:blip>
-          <a:stretch>
-            <a:fillRect/>
-          </a:stretch>
-        </p:blipFill>
-        <p:spPr>
-          <a:xfrm>
-            <a:off x="1100174" y="0"/>
-            <a:ext cx="3248526" cy="6858000"/>
-          </a:xfrm>
-          <a:prstGeom prst="rect">
-            <a:avLst/>
-          </a:prstGeom>
-        </p:spPr>
-      </p:pic>
-      <p:sp>
-        <p:nvSpPr>
-          <p:cNvPr id="9" name="모서리가 둥근 직사각형 8"/>
-          <p:cNvSpPr/>
-          <p:nvPr/>
-        </p:nvSpPr>
-        <p:spPr>
-          <a:xfrm>
-            <a:off x="1381603" y="2818963"/>
-            <a:ext cx="2656997" cy="1149718"/>
-          </a:xfrm>
-          <a:prstGeom prst="roundRect">
-            <a:avLst>
-              <a:gd name="adj" fmla="val 0"/>
-            </a:avLst>
-          </a:prstGeom>
-          <a:noFill/>
-          <a:ln w="57150">
-            <a:solidFill>
-              <a:srgbClr val="FF0000"/>
-            </a:solidFill>
-          </a:ln>
-          <a:effectLst/>
-        </p:spPr>
-        <p:style>
-          <a:lnRef idx="2">
-            <a:schemeClr val="accent2"/>
-          </a:lnRef>
-          <a:fillRef idx="1">
-            <a:schemeClr val="lt1"/>
-          </a:fillRef>
-          <a:effectRef idx="0">
-            <a:schemeClr val="accent2"/>
-          </a:effectRef>
-          <a:fontRef idx="minor">
-            <a:schemeClr val="dk1"/>
-          </a:fontRef>
-        </p:style>
-        <p:txBody>
-          <a:bodyPr rtlCol="0" anchor="ctr"/>
-          <a:lstStyle/>
-          <a:p>
-            <a:pPr algn="ctr"/>
-            <a:endParaRPr lang="ko-KR" altLang="en-US"/>
-          </a:p>
-        </p:txBody>
-      </p:sp>
-      <p:sp>
-        <p:nvSpPr>
-          <p:cNvPr id="12" name="타원 11"/>
-          <p:cNvSpPr/>
-          <p:nvPr/>
-        </p:nvSpPr>
-        <p:spPr>
-          <a:xfrm>
-            <a:off x="5752863" y="3053153"/>
-            <a:ext cx="237392" cy="237392"/>
-          </a:xfrm>
-          <a:prstGeom prst="ellipse">
-            <a:avLst/>
-          </a:prstGeom>
-          <a:noFill/>
-          <a:ln w="28575">
-            <a:solidFill>
-              <a:srgbClr val="FF0000"/>
-            </a:solidFill>
-          </a:ln>
-        </p:spPr>
-        <p:style>
-          <a:lnRef idx="2">
-            <a:schemeClr val="accent1">
-              <a:shade val="50000"/>
-            </a:schemeClr>
-          </a:lnRef>
-          <a:fillRef idx="1">
-            <a:schemeClr val="accent1"/>
-          </a:fillRef>
-          <a:effectRef idx="0">
-            <a:schemeClr val="accent1"/>
-          </a:effectRef>
-          <a:fontRef idx="minor">
-            <a:schemeClr val="lt1"/>
-          </a:fontRef>
-        </p:style>
-        <p:txBody>
-          <a:bodyPr rtlCol="0" anchor="ctr"/>
-          <a:lstStyle/>
-          <a:p>
-            <a:pPr algn="ctr"/>
-            <a:r>
-              <a:rPr lang="en-US" altLang="ko-KR" b="1" dirty="0" smtClean="0">
-                <a:solidFill>
-                  <a:srgbClr val="FF0000"/>
-                </a:solidFill>
-              </a:rPr>
-              <a:t>1</a:t>
-            </a:r>
-            <a:endParaRPr lang="ko-KR" altLang="en-US" b="1" dirty="0">
-              <a:solidFill>
-                <a:srgbClr val="FF0000"/>
-              </a:solidFill>
-            </a:endParaRPr>
-          </a:p>
-        </p:txBody>
-      </p:sp>
-      <p:sp>
-        <p:nvSpPr>
-          <p:cNvPr id="14" name="TextBox 13"/>
-          <p:cNvSpPr txBox="1"/>
-          <p:nvPr/>
-        </p:nvSpPr>
-        <p:spPr>
-          <a:xfrm>
-            <a:off x="5990257" y="3009463"/>
-            <a:ext cx="5296868" cy="923330"/>
-          </a:xfrm>
-          <a:prstGeom prst="rect">
-            <a:avLst/>
-          </a:prstGeom>
-          <a:noFill/>
-        </p:spPr>
-        <p:txBody>
-          <a:bodyPr wrap="square" rtlCol="0">
-            <a:spAutoFit/>
-          </a:bodyPr>
-          <a:lstStyle/>
-          <a:p>
-            <a:r>
-              <a:rPr lang="ko-KR" altLang="en-US" b="1" dirty="0" smtClean="0"/>
-              <a:t>앨범 수정</a:t>
-            </a:r>
-            <a:r>
-              <a:rPr lang="en-US" altLang="ko-KR" b="1" dirty="0" smtClean="0"/>
-              <a:t>, </a:t>
-            </a:r>
-            <a:r>
-              <a:rPr lang="ko-KR" altLang="en-US" b="1" dirty="0" smtClean="0"/>
-              <a:t>삭제 버튼</a:t>
-            </a:r>
-            <a:endParaRPr lang="en-US" altLang="ko-KR" b="1" dirty="0" smtClean="0"/>
-          </a:p>
-          <a:p>
-            <a:pPr marL="342900" indent="-342900">
-              <a:buAutoNum type="arabicPeriod"/>
-            </a:pPr>
-            <a:r>
-              <a:rPr lang="ko-KR" altLang="en-US" b="1" dirty="0" smtClean="0"/>
-              <a:t>앨범 수정 </a:t>
-            </a:r>
-            <a:r>
-              <a:rPr lang="ko-KR" altLang="en-US" b="1" dirty="0" err="1" smtClean="0"/>
-              <a:t>클릭시</a:t>
-            </a:r>
-            <a:r>
-              <a:rPr lang="ko-KR" altLang="en-US" b="1" dirty="0" smtClean="0"/>
-              <a:t> 수정 페이지로 이동</a:t>
-            </a:r>
-            <a:endParaRPr lang="en-US" altLang="ko-KR" b="1" dirty="0" smtClean="0"/>
-          </a:p>
-          <a:p>
-            <a:pPr marL="342900" indent="-342900">
-              <a:buAutoNum type="arabicPeriod"/>
-            </a:pPr>
-            <a:r>
-              <a:rPr lang="ko-KR" altLang="en-US" b="1" dirty="0" smtClean="0"/>
-              <a:t>앨범 삭제 </a:t>
-            </a:r>
-            <a:r>
-              <a:rPr lang="ko-KR" altLang="en-US" b="1" dirty="0" err="1" smtClean="0"/>
-              <a:t>클릭시</a:t>
-            </a:r>
-            <a:r>
-              <a:rPr lang="ko-KR" altLang="en-US" b="1" dirty="0" smtClean="0"/>
-              <a:t> 앨범 삭제</a:t>
-            </a:r>
-            <a:endParaRPr lang="en-US" altLang="ko-KR" b="1" dirty="0" smtClean="0"/>
-          </a:p>
-        </p:txBody>
-      </p:sp>
-      <p:sp>
-        <p:nvSpPr>
-          <p:cNvPr id="16" name="타원 15"/>
-          <p:cNvSpPr/>
-          <p:nvPr/>
-        </p:nvSpPr>
-        <p:spPr>
-          <a:xfrm>
-            <a:off x="4462530" y="3310304"/>
-            <a:ext cx="237392" cy="237392"/>
-          </a:xfrm>
-          <a:prstGeom prst="ellipse">
-            <a:avLst/>
-          </a:prstGeom>
-          <a:noFill/>
-          <a:ln w="28575">
-            <a:solidFill>
-              <a:srgbClr val="FF0000"/>
-            </a:solidFill>
-          </a:ln>
-        </p:spPr>
-        <p:style>
-          <a:lnRef idx="2">
-            <a:schemeClr val="accent1">
-              <a:shade val="50000"/>
-            </a:schemeClr>
-          </a:lnRef>
-          <a:fillRef idx="1">
-            <a:schemeClr val="accent1"/>
-          </a:fillRef>
-          <a:effectRef idx="0">
-            <a:schemeClr val="accent1"/>
-          </a:effectRef>
-          <a:fontRef idx="minor">
-            <a:schemeClr val="lt1"/>
-          </a:fontRef>
-        </p:style>
-        <p:txBody>
-          <a:bodyPr rtlCol="0" anchor="ctr"/>
-          <a:lstStyle/>
-          <a:p>
-            <a:pPr algn="ctr"/>
-            <a:r>
-              <a:rPr lang="en-US" altLang="ko-KR" b="1" dirty="0" smtClean="0">
-                <a:solidFill>
-                  <a:srgbClr val="FF0000"/>
-                </a:solidFill>
-              </a:rPr>
-              <a:t>1</a:t>
-            </a:r>
-            <a:endParaRPr lang="ko-KR" altLang="en-US" b="1" dirty="0">
-              <a:solidFill>
-                <a:srgbClr val="FF0000"/>
-              </a:solidFill>
-            </a:endParaRPr>
-          </a:p>
-        </p:txBody>
-      </p:sp>
-    </p:spTree>
-    <p:extLst>
-      <p:ext uri="{BB962C8B-B14F-4D97-AF65-F5344CB8AC3E}">
-        <p14:creationId xmlns:p14="http://schemas.microsoft.com/office/powerpoint/2010/main" val="635950635"/>
-      </p:ext>
-    </p:extLst>
-  </p:cSld>
-  <p:clrMapOvr>
-    <a:masterClrMapping/>
-  </p:clrMapOvr>
-  <p:timing>
-    <p:tnLst>
-      <p:par>
-        <p:cTn id="1" dur="indefinite" restart="never" nodeType="tmRoot"/>
-      </p:par>
-    </p:tnLst>
-  </p:timing>
-</p:sld>
-</file>
-
-<file path=ppt/slides/slide15.xml><?xml version="1.0" encoding="utf-8"?>
-<p:sld xmlns:a="http://schemas.openxmlformats.org/drawingml/2006/main" xmlns:r="http://schemas.openxmlformats.org/officeDocument/2006/relationships" xmlns:p="http://schemas.openxmlformats.org/presentationml/2006/main">
-  <p:cSld>
-    <p:spTree>
-      <p:nvGrpSpPr>
-        <p:cNvPr id="1" name=""/>
-        <p:cNvGrpSpPr/>
-        <p:nvPr/>
-      </p:nvGrpSpPr>
-      <p:grpSpPr>
-        <a:xfrm>
-          <a:off x="0" y="0"/>
-          <a:ext cx="0" cy="0"/>
-          <a:chOff x="0" y="0"/>
-          <a:chExt cx="0" cy="0"/>
-        </a:xfrm>
-      </p:grpSpPr>
-      <p:pic>
-        <p:nvPicPr>
           <p:cNvPr id="2" name="그림 1"/>
           <p:cNvPicPr>
             <a:picLocks noChangeAspect="1"/>
@@ -7488,7 +6722,7 @@
 </p:sld>
 </file>
 
-<file path=ppt/slides/slide16.xml><?xml version="1.0" encoding="utf-8"?>
+<file path=ppt/slides/slide15.xml><?xml version="1.0" encoding="utf-8"?>
 <p:sld xmlns:a="http://schemas.openxmlformats.org/drawingml/2006/main" xmlns:r="http://schemas.openxmlformats.org/officeDocument/2006/relationships" xmlns:p="http://schemas.openxmlformats.org/presentationml/2006/main">
   <p:cSld>
     <p:spTree>

</xml_diff>